<commit_message>
modified styling of ppt
</commit_message>
<xml_diff>
--- a/docs/Data_Science_Accelerator-1.4.pptx
+++ b/docs/Data_Science_Accelerator-1.4.pptx
@@ -11,7 +11,7 @@
     <p:handoutMasterId r:id="rId36"/>
   </p:handoutMasterIdLst>
   <p:sldIdLst>
-    <p:sldId id="1384" r:id="rId5"/>
+    <p:sldId id="1415" r:id="rId5"/>
     <p:sldId id="1394" r:id="rId6"/>
     <p:sldId id="1385" r:id="rId7"/>
     <p:sldId id="1378" r:id="rId8"/>
@@ -5116,6 +5116,319 @@
       <dsp:cNvGrpSpPr/>
     </dsp:nvGrpSpPr>
     <dsp:grpSpPr/>
+    <dsp:sp modelId="{1C229D24-0D3A-5045-A98E-4D94C0733F60}">
+      <dsp:nvSpPr>
+        <dsp:cNvPr id="0" name=""/>
+        <dsp:cNvSpPr/>
+      </dsp:nvSpPr>
+      <dsp:spPr>
+        <a:xfrm>
+          <a:off x="2343" y="2005"/>
+          <a:ext cx="4956926" cy="578300"/>
+        </a:xfrm>
+        <a:prstGeom prst="roundRect">
+          <a:avLst>
+            <a:gd name="adj" fmla="val 10000"/>
+          </a:avLst>
+        </a:prstGeom>
+        <a:solidFill>
+          <a:schemeClr val="accent1">
+            <a:hueOff val="0"/>
+            <a:satOff val="0"/>
+            <a:lumOff val="0"/>
+            <a:alphaOff val="0"/>
+          </a:schemeClr>
+        </a:solidFill>
+        <a:ln w="25400" cap="flat" cmpd="sng" algn="ctr">
+          <a:solidFill>
+            <a:schemeClr val="lt1">
+              <a:hueOff val="0"/>
+              <a:satOff val="0"/>
+              <a:lumOff val="0"/>
+              <a:alphaOff val="0"/>
+            </a:schemeClr>
+          </a:solidFill>
+          <a:prstDash val="solid"/>
+        </a:ln>
+        <a:effectLst/>
+      </dsp:spPr>
+      <dsp:style>
+        <a:lnRef idx="2">
+          <a:scrgbClr r="0" g="0" b="0"/>
+        </a:lnRef>
+        <a:fillRef idx="1">
+          <a:scrgbClr r="0" g="0" b="0"/>
+        </a:fillRef>
+        <a:effectRef idx="0">
+          <a:scrgbClr r="0" g="0" b="0"/>
+        </a:effectRef>
+        <a:fontRef idx="minor">
+          <a:schemeClr val="lt1"/>
+        </a:fontRef>
+      </dsp:style>
+      <dsp:txBody>
+        <a:bodyPr spcFirstLastPara="0" vert="horz" wrap="square" lIns="95250" tIns="95250" rIns="95250" bIns="95250" numCol="1" spcCol="1270" anchor="ctr" anchorCtr="0">
+          <a:noAutofit/>
+        </a:bodyPr>
+        <a:lstStyle/>
+        <a:p>
+          <a:pPr lvl="0" algn="ctr" defTabSz="1111250">
+            <a:lnSpc>
+              <a:spcPct val="90000"/>
+            </a:lnSpc>
+            <a:spcBef>
+              <a:spcPct val="0"/>
+            </a:spcBef>
+            <a:spcAft>
+              <a:spcPct val="35000"/>
+            </a:spcAft>
+          </a:pPr>
+          <a:r>
+            <a:rPr lang="en-US" sz="2500" kern="1200" dirty="0" smtClean="0"/>
+            <a:t>Data Science Accelerator</a:t>
+          </a:r>
+          <a:endParaRPr lang="en-US" sz="2500" kern="1200" dirty="0"/>
+        </a:p>
+      </dsp:txBody>
+      <dsp:txXfrm>
+        <a:off x="19281" y="18943"/>
+        <a:ext cx="4923050" cy="544424"/>
+      </dsp:txXfrm>
+    </dsp:sp>
+    <dsp:sp modelId="{F41ED8C8-352E-1848-8615-1A569DA81B64}">
+      <dsp:nvSpPr>
+        <dsp:cNvPr id="0" name=""/>
+        <dsp:cNvSpPr/>
+      </dsp:nvSpPr>
+      <dsp:spPr>
+        <a:xfrm>
+          <a:off x="7181" y="740395"/>
+          <a:ext cx="2374410" cy="3110406"/>
+        </a:xfrm>
+        <a:prstGeom prst="roundRect">
+          <a:avLst>
+            <a:gd name="adj" fmla="val 10000"/>
+          </a:avLst>
+        </a:prstGeom>
+        <a:solidFill>
+          <a:schemeClr val="accent3">
+            <a:lumMod val="60000"/>
+            <a:lumOff val="40000"/>
+          </a:schemeClr>
+        </a:solidFill>
+        <a:ln w="25400" cap="flat" cmpd="sng" algn="ctr">
+          <a:solidFill>
+            <a:schemeClr val="lt1">
+              <a:hueOff val="0"/>
+              <a:satOff val="0"/>
+              <a:lumOff val="0"/>
+              <a:alphaOff val="0"/>
+            </a:schemeClr>
+          </a:solidFill>
+          <a:prstDash val="solid"/>
+        </a:ln>
+        <a:effectLst/>
+      </dsp:spPr>
+      <dsp:style>
+        <a:lnRef idx="2">
+          <a:scrgbClr r="0" g="0" b="0"/>
+        </a:lnRef>
+        <a:fillRef idx="1">
+          <a:scrgbClr r="0" g="0" b="0"/>
+        </a:fillRef>
+        <a:effectRef idx="0">
+          <a:scrgbClr r="0" g="0" b="0"/>
+        </a:effectRef>
+        <a:fontRef idx="minor">
+          <a:schemeClr val="lt1"/>
+        </a:fontRef>
+      </dsp:style>
+      <dsp:txBody>
+        <a:bodyPr spcFirstLastPara="0" vert="horz" wrap="square" lIns="95250" tIns="95250" rIns="95250" bIns="95250" numCol="1" spcCol="1270" anchor="ctr" anchorCtr="0">
+          <a:noAutofit/>
+        </a:bodyPr>
+        <a:lstStyle/>
+        <a:p>
+          <a:pPr lvl="0" algn="ctr" defTabSz="1111250">
+            <a:lnSpc>
+              <a:spcPct val="90000"/>
+            </a:lnSpc>
+            <a:spcBef>
+              <a:spcPct val="0"/>
+            </a:spcBef>
+            <a:spcAft>
+              <a:spcPct val="35000"/>
+            </a:spcAft>
+          </a:pPr>
+          <a:r>
+            <a:rPr lang="en-US" sz="2500" kern="1200" smtClean="0"/>
+            <a:t>Exploratory Space</a:t>
+          </a:r>
+        </a:p>
+        <a:p>
+          <a:pPr lvl="0" algn="l" defTabSz="1111250">
+            <a:lnSpc>
+              <a:spcPct val="90000"/>
+            </a:lnSpc>
+            <a:spcBef>
+              <a:spcPct val="0"/>
+            </a:spcBef>
+            <a:spcAft>
+              <a:spcPct val="35000"/>
+            </a:spcAft>
+          </a:pPr>
+          <a:r>
+            <a:rPr lang="en-US" sz="1200" kern="1200" smtClean="0"/>
+            <a:t>- </a:t>
+          </a:r>
+          <a:r>
+            <a:rPr lang="en-US" sz="1200" kern="1200" dirty="0" smtClean="0"/>
+            <a:t>private</a:t>
+          </a:r>
+          <a:r>
+            <a:rPr lang="en-US" sz="1200" kern="1200" baseline="0" dirty="0" smtClean="0"/>
+            <a:t> and collaborative space</a:t>
+          </a:r>
+        </a:p>
+        <a:p>
+          <a:pPr lvl="0" algn="l" defTabSz="1111250">
+            <a:lnSpc>
+              <a:spcPct val="90000"/>
+            </a:lnSpc>
+            <a:spcBef>
+              <a:spcPct val="0"/>
+            </a:spcBef>
+            <a:spcAft>
+              <a:spcPct val="35000"/>
+            </a:spcAft>
+          </a:pPr>
+          <a:r>
+            <a:rPr lang="en-US" sz="1200" kern="1200" baseline="0" dirty="0" smtClean="0"/>
+            <a:t>- for Data R&amp;D Work</a:t>
+          </a:r>
+          <a:endParaRPr lang="en-US" sz="1200" kern="1200" dirty="0"/>
+        </a:p>
+      </dsp:txBody>
+      <dsp:txXfrm>
+        <a:off x="76725" y="809939"/>
+        <a:ext cx="2235322" cy="2971318"/>
+      </dsp:txXfrm>
+    </dsp:sp>
+    <dsp:sp modelId="{9DBA7151-CADB-0B49-ACB1-BAD7695A255C}">
+      <dsp:nvSpPr>
+        <dsp:cNvPr id="0" name=""/>
+        <dsp:cNvSpPr/>
+      </dsp:nvSpPr>
+      <dsp:spPr>
+        <a:xfrm>
+          <a:off x="2581042" y="740395"/>
+          <a:ext cx="2373389" cy="3110406"/>
+        </a:xfrm>
+        <a:prstGeom prst="roundRect">
+          <a:avLst>
+            <a:gd name="adj" fmla="val 10000"/>
+          </a:avLst>
+        </a:prstGeom>
+        <a:solidFill>
+          <a:srgbClr val="92D050"/>
+        </a:solidFill>
+        <a:ln w="25400" cap="flat" cmpd="sng" algn="ctr">
+          <a:solidFill>
+            <a:schemeClr val="lt1">
+              <a:hueOff val="0"/>
+              <a:satOff val="0"/>
+              <a:lumOff val="0"/>
+              <a:alphaOff val="0"/>
+            </a:schemeClr>
+          </a:solidFill>
+          <a:prstDash val="solid"/>
+        </a:ln>
+        <a:effectLst/>
+      </dsp:spPr>
+      <dsp:style>
+        <a:lnRef idx="2">
+          <a:scrgbClr r="0" g="0" b="0"/>
+        </a:lnRef>
+        <a:fillRef idx="1">
+          <a:scrgbClr r="0" g="0" b="0"/>
+        </a:fillRef>
+        <a:effectRef idx="0">
+          <a:scrgbClr r="0" g="0" b="0"/>
+        </a:effectRef>
+        <a:fontRef idx="minor">
+          <a:schemeClr val="lt1"/>
+        </a:fontRef>
+      </dsp:style>
+      <dsp:txBody>
+        <a:bodyPr spcFirstLastPara="0" vert="horz" wrap="square" lIns="95250" tIns="95250" rIns="95250" bIns="95250" numCol="1" spcCol="1270" anchor="ctr" anchorCtr="0">
+          <a:noAutofit/>
+        </a:bodyPr>
+        <a:lstStyle/>
+        <a:p>
+          <a:pPr lvl="0" algn="ctr" defTabSz="1111250">
+            <a:lnSpc>
+              <a:spcPct val="90000"/>
+            </a:lnSpc>
+            <a:spcBef>
+              <a:spcPct val="0"/>
+            </a:spcBef>
+            <a:spcAft>
+              <a:spcPct val="35000"/>
+            </a:spcAft>
+          </a:pPr>
+          <a:r>
+            <a:rPr lang="en-US" sz="2500" kern="1200" dirty="0" smtClean="0"/>
+            <a:t>Modules              </a:t>
+          </a:r>
+        </a:p>
+        <a:p>
+          <a:pPr lvl="0" algn="ctr" defTabSz="1111250">
+            <a:lnSpc>
+              <a:spcPct val="90000"/>
+            </a:lnSpc>
+            <a:spcBef>
+              <a:spcPct val="0"/>
+            </a:spcBef>
+            <a:spcAft>
+              <a:spcPct val="35000"/>
+            </a:spcAft>
+          </a:pPr>
+          <a:endParaRPr lang="en-US" sz="1800" kern="1200" dirty="0" smtClean="0"/>
+        </a:p>
+        <a:p>
+          <a:pPr lvl="0" algn="l" defTabSz="1111250">
+            <a:lnSpc>
+              <a:spcPct val="90000"/>
+            </a:lnSpc>
+            <a:spcBef>
+              <a:spcPct val="0"/>
+            </a:spcBef>
+            <a:spcAft>
+              <a:spcPct val="35000"/>
+            </a:spcAft>
+          </a:pPr>
+          <a:r>
+            <a:rPr lang="en-US" sz="1200" kern="1200" dirty="0" smtClean="0"/>
+            <a:t>- templates</a:t>
+          </a:r>
+          <a:br>
+            <a:rPr lang="en-US" sz="1200" kern="1200" dirty="0" smtClean="0"/>
+          </a:br>
+          <a:r>
+            <a:rPr lang="en-US" sz="1200" kern="1200" dirty="0" smtClean="0"/>
+            <a:t>- ready</a:t>
+          </a:r>
+          <a:r>
+            <a:rPr lang="en-US" sz="1200" kern="1200" baseline="0" dirty="0" smtClean="0"/>
+            <a:t> to be deployed</a:t>
+          </a:r>
+        </a:p>
+      </dsp:txBody>
+      <dsp:txXfrm>
+        <a:off x="2650556" y="809909"/>
+        <a:ext cx="2234361" cy="2971378"/>
+      </dsp:txXfrm>
+    </dsp:sp>
   </dsp:spTree>
 </dsp:drawing>
 </file>
@@ -11498,7 +11811,7 @@
           <a:p>
             <a:fld id="{7F5E9BF7-95E4-A242-BA1D-05FDCF603BE6}" type="datetime1">
               <a:rPr lang="en-US" smtClean="0"/>
-              <a:t>9/8/2016</a:t>
+              <a:t>9/14/2016</a:t>
             </a:fld>
             <a:endParaRPr lang="en-US"/>
           </a:p>
@@ -11664,7 +11977,7 @@
           <a:p>
             <a:fld id="{165DBCB1-0306-AD41-9452-11E7C08D5C04}" type="datetime1">
               <a:rPr lang="en-US" smtClean="0"/>
-              <a:t>9/8/2016</a:t>
+              <a:t>9/14/2016</a:t>
             </a:fld>
             <a:endParaRPr lang="en-US"/>
           </a:p>
@@ -11998,7 +12311,7 @@
           <a:p>
             <a:fld id="{7AE90029-A909-AD4E-9775-A0D64990AD22}" type="slidenum">
               <a:rPr lang="en-US" smtClean="0"/>
-              <a:t>1</a:t>
+              <a:t>2</a:t>
             </a:fld>
             <a:endParaRPr lang="en-US"/>
           </a:p>
@@ -12007,7 +12320,7 @@
     </p:spTree>
     <p:extLst>
       <p:ext uri="{BB962C8B-B14F-4D97-AF65-F5344CB8AC3E}">
-        <p14:creationId xmlns:p14="http://schemas.microsoft.com/office/powerpoint/2010/main" val="105955498"/>
+        <p14:creationId xmlns:p14="http://schemas.microsoft.com/office/powerpoint/2010/main" val="483939224"/>
       </p:ext>
     </p:extLst>
   </p:cSld>
@@ -12063,17 +12376,7 @@
           <a:p>
             <a:r>
               <a:rPr lang="en-US" dirty="0" smtClean="0"/>
-              <a:t>UI – friendly</a:t>
-            </a:r>
-            <a:r>
-              <a:rPr lang="en-US" baseline="0" dirty="0" smtClean="0"/>
-              <a:t> for DS</a:t>
-            </a:r>
-          </a:p>
-          <a:p>
-            <a:r>
-              <a:rPr lang="en-US" baseline="0" dirty="0" smtClean="0"/>
-              <a:t>EM – inherit security model from enterprise</a:t>
+              <a:t>Add introduction sentence</a:t>
             </a:r>
             <a:endParaRPr lang="en-US" dirty="0"/>
           </a:p>
@@ -12096,7 +12399,7 @@
           <a:p>
             <a:fld id="{7AE90029-A909-AD4E-9775-A0D64990AD22}" type="slidenum">
               <a:rPr lang="en-US" smtClean="0"/>
-              <a:t>10</a:t>
+              <a:t>11</a:t>
             </a:fld>
             <a:endParaRPr lang="en-US"/>
           </a:p>
@@ -12105,7 +12408,7 @@
     </p:spTree>
     <p:extLst>
       <p:ext uri="{BB962C8B-B14F-4D97-AF65-F5344CB8AC3E}">
-        <p14:creationId xmlns:p14="http://schemas.microsoft.com/office/powerpoint/2010/main" val="826994066"/>
+        <p14:creationId xmlns:p14="http://schemas.microsoft.com/office/powerpoint/2010/main" val="3579164598"/>
       </p:ext>
     </p:extLst>
   </p:cSld>
@@ -12159,10 +12462,6 @@
           <a:bodyPr/>
           <a:lstStyle/>
           <a:p>
-            <a:r>
-              <a:rPr lang="en-US" dirty="0" smtClean="0"/>
-              <a:t>Add introduction sentence</a:t>
-            </a:r>
             <a:endParaRPr lang="en-US" dirty="0"/>
           </a:p>
         </p:txBody>
@@ -12184,7 +12483,7 @@
           <a:p>
             <a:fld id="{7AE90029-A909-AD4E-9775-A0D64990AD22}" type="slidenum">
               <a:rPr lang="en-US" smtClean="0"/>
-              <a:t>11</a:t>
+              <a:t>13</a:t>
             </a:fld>
             <a:endParaRPr lang="en-US"/>
           </a:p>
@@ -12193,7 +12492,7 @@
     </p:spTree>
     <p:extLst>
       <p:ext uri="{BB962C8B-B14F-4D97-AF65-F5344CB8AC3E}">
-        <p14:creationId xmlns:p14="http://schemas.microsoft.com/office/powerpoint/2010/main" val="3579164598"/>
+        <p14:creationId xmlns:p14="http://schemas.microsoft.com/office/powerpoint/2010/main" val="3221557343"/>
       </p:ext>
     </p:extLst>
   </p:cSld>
@@ -12247,6 +12546,24 @@
           <a:bodyPr/>
           <a:lstStyle/>
           <a:p>
+            <a:r>
+              <a:rPr lang="en-US" dirty="0" smtClean="0"/>
+              <a:t>Login page</a:t>
+            </a:r>
+            <a:r>
+              <a:rPr lang="en-US" baseline="0" dirty="0" smtClean="0"/>
+              <a:t> which check credentials against preconfigured LDAP</a:t>
+            </a:r>
+          </a:p>
+          <a:p>
+            <a:r>
+              <a:rPr lang="en-US" baseline="0" dirty="0" smtClean="0"/>
+              <a:t>Remark: master password to LDAP is better to save in encrypted format and provide to application a pass to a key for </a:t>
+            </a:r>
+            <a:r>
+              <a:rPr lang="en-US" baseline="0" dirty="0" err="1" smtClean="0"/>
+              <a:t>decyprion</a:t>
+            </a:r>
             <a:endParaRPr lang="en-US" dirty="0"/>
           </a:p>
         </p:txBody>
@@ -12268,7 +12585,7 @@
           <a:p>
             <a:fld id="{7AE90029-A909-AD4E-9775-A0D64990AD22}" type="slidenum">
               <a:rPr lang="en-US" smtClean="0"/>
-              <a:t>13</a:t>
+              <a:t>17</a:t>
             </a:fld>
             <a:endParaRPr lang="en-US"/>
           </a:p>
@@ -12277,7 +12594,7 @@
     </p:spTree>
     <p:extLst>
       <p:ext uri="{BB962C8B-B14F-4D97-AF65-F5344CB8AC3E}">
-        <p14:creationId xmlns:p14="http://schemas.microsoft.com/office/powerpoint/2010/main" val="3221557343"/>
+        <p14:creationId xmlns:p14="http://schemas.microsoft.com/office/powerpoint/2010/main" val="3849159168"/>
       </p:ext>
     </p:extLst>
   </p:cSld>
@@ -12332,30 +12649,56 @@
           <a:lstStyle/>
           <a:p>
             <a:r>
-              <a:rPr lang="en-US" dirty="0" smtClean="0"/>
-              <a:t>Login page</a:t>
-            </a:r>
-            <a:r>
-              <a:rPr lang="en-US" baseline="0" dirty="0" smtClean="0"/>
-              <a:t> which check </a:t>
-            </a:r>
-            <a:r>
-              <a:rPr lang="en-US" baseline="0" dirty="0" smtClean="0"/>
-              <a:t>credentials </a:t>
-            </a:r>
-            <a:r>
-              <a:rPr lang="en-US" baseline="0" dirty="0" smtClean="0"/>
-              <a:t>against preconfigured LDAP</a:t>
-            </a:r>
-          </a:p>
-          <a:p>
-            <a:r>
-              <a:rPr lang="en-US" baseline="0" dirty="0" smtClean="0"/>
-              <a:t>Remark: master password to LDAP is better to save in encrypted format and provide to application a pass to a key for </a:t>
-            </a:r>
-            <a:r>
-              <a:rPr lang="en-US" baseline="0" dirty="0" err="1" smtClean="0"/>
-              <a:t>decyprion</a:t>
+              <a:rPr lang="en-US" sz="900" kern="1200" dirty="0" smtClean="0">
+                <a:solidFill>
+                  <a:schemeClr val="tx1"/>
+                </a:solidFill>
+                <a:effectLst/>
+                <a:latin typeface="+mn-lt"/>
+                <a:ea typeface="+mn-ea"/>
+                <a:cs typeface="+mn-cs"/>
+              </a:rPr>
+              <a:t>When user logs in first time (Figure 1), he/she expected to be asked to provide public SSH key and only after the environment will be created (in this save, bucket on S3, subnet in VPN). </a:t>
+            </a:r>
+          </a:p>
+          <a:p>
+            <a:r>
+              <a:rPr lang="en-US" sz="900" kern="1200" dirty="0" smtClean="0">
+                <a:solidFill>
+                  <a:schemeClr val="tx1"/>
+                </a:solidFill>
+                <a:effectLst/>
+                <a:latin typeface="+mn-lt"/>
+                <a:ea typeface="+mn-ea"/>
+                <a:cs typeface="+mn-cs"/>
+              </a:rPr>
+              <a:t>A button “Create” is inactive until key is loaded. </a:t>
+            </a:r>
+          </a:p>
+          <a:p>
+            <a:r>
+              <a:rPr lang="en-US" sz="900" kern="1200" dirty="0" smtClean="0">
+                <a:solidFill>
+                  <a:schemeClr val="tx1"/>
+                </a:solidFill>
+                <a:effectLst/>
+                <a:latin typeface="+mn-lt"/>
+                <a:ea typeface="+mn-ea"/>
+                <a:cs typeface="+mn-cs"/>
+              </a:rPr>
+              <a:t>There is a link “Where I can get public key?” which opens pop-up with instruction how to generate public/private SSH keys on Windows and Mac and what exactly expected from user. It must be cleat for not very technical guy. After clicking “Create” button it must be some “wait until load” message which will wait backend to perform all preparation steps and redirect user to next</a:t>
+            </a:r>
+            <a:r>
+              <a:rPr lang="en-US" sz="900" kern="1200" baseline="0" dirty="0" smtClean="0">
+                <a:solidFill>
+                  <a:schemeClr val="tx1"/>
+                </a:solidFill>
+                <a:effectLst/>
+                <a:latin typeface="+mn-lt"/>
+                <a:ea typeface="+mn-ea"/>
+                <a:cs typeface="+mn-cs"/>
+              </a:rPr>
+              <a:t> page</a:t>
             </a:r>
             <a:endParaRPr lang="en-US" dirty="0"/>
           </a:p>
@@ -12378,7 +12721,7 @@
           <a:p>
             <a:fld id="{7AE90029-A909-AD4E-9775-A0D64990AD22}" type="slidenum">
               <a:rPr lang="en-US" smtClean="0"/>
-              <a:t>17</a:t>
+              <a:t>18</a:t>
             </a:fld>
             <a:endParaRPr lang="en-US"/>
           </a:p>
@@ -12387,7 +12730,7 @@
     </p:spTree>
     <p:extLst>
       <p:ext uri="{BB962C8B-B14F-4D97-AF65-F5344CB8AC3E}">
-        <p14:creationId xmlns:p14="http://schemas.microsoft.com/office/powerpoint/2010/main" val="3849159168"/>
+        <p14:creationId xmlns:p14="http://schemas.microsoft.com/office/powerpoint/2010/main" val="1540994898"/>
       </p:ext>
     </p:extLst>
   </p:cSld>
@@ -12451,10 +12794,20 @@
                 <a:ea typeface="+mn-ea"/>
                 <a:cs typeface="+mn-cs"/>
               </a:rPr>
-              <a:t>When user logs in first time (Figure 1), he/she expected to be asked to provide public SSH key and only after the environment will be created (in this save, bucket on S3, subnet in VPN). </a:t>
-            </a:r>
-          </a:p>
-          <a:p>
+              <a:t>Also, the page Figure 2 List resources is display to user with preconfigured </a:t>
+            </a:r>
+            <a:r>
+              <a:rPr lang="en-US" sz="900" kern="1200" dirty="0" err="1" smtClean="0">
+                <a:solidFill>
+                  <a:schemeClr val="tx1"/>
+                </a:solidFill>
+                <a:effectLst/>
+                <a:latin typeface="+mn-lt"/>
+                <a:ea typeface="+mn-ea"/>
+                <a:cs typeface="+mn-cs"/>
+              </a:rPr>
+              <a:t>env</a:t>
+            </a:r>
             <a:r>
               <a:rPr lang="en-US" sz="900" kern="1200" dirty="0" smtClean="0">
                 <a:solidFill>
@@ -12465,10 +12818,20 @@
                 <a:ea typeface="+mn-ea"/>
                 <a:cs typeface="+mn-cs"/>
               </a:rPr>
-              <a:t>A button “Create” is inactive until key is loaded. </a:t>
-            </a:r>
-          </a:p>
-          <a:p>
+              <a:t> (subnet, storage, </a:t>
+            </a:r>
+            <a:r>
+              <a:rPr lang="en-US" sz="900" kern="1200" dirty="0" err="1" smtClean="0">
+                <a:solidFill>
+                  <a:schemeClr val="tx1"/>
+                </a:solidFill>
+                <a:effectLst/>
+                <a:latin typeface="+mn-lt"/>
+                <a:ea typeface="+mn-ea"/>
+                <a:cs typeface="+mn-cs"/>
+              </a:rPr>
+              <a:t>etc</a:t>
+            </a:r>
             <a:r>
               <a:rPr lang="en-US" sz="900" kern="1200" dirty="0" smtClean="0">
                 <a:solidFill>
@@ -12479,7 +12842,100 @@
                 <a:ea typeface="+mn-ea"/>
                 <a:cs typeface="+mn-cs"/>
               </a:rPr>
-              <a:t>There is a link “Where I can get public key?” which opens pop-up with instruction how to generate public/private SSH keys on Windows and Mac and what exactly expected from user. It must be cleat for not very technical guy. After clicking “Create” button it must be some “wait until load” message which will wait backend to perform all preparation steps and redirect user to next</a:t>
+              <a:t>, so user is not the first time here and already registered vital components). On this page user can see short description of running resources like resource name, resource size (shape for EC2 instance and number of slaves X shape of slave for EMR) and status of resource (which can be </a:t>
+            </a:r>
+            <a:r>
+              <a:rPr lang="en-US" sz="900" i="1" kern="1200" dirty="0" smtClean="0">
+                <a:solidFill>
+                  <a:schemeClr val="tx1"/>
+                </a:solidFill>
+                <a:effectLst/>
+                <a:latin typeface="+mn-lt"/>
+                <a:ea typeface="+mn-ea"/>
+                <a:cs typeface="+mn-cs"/>
+              </a:rPr>
+              <a:t>running</a:t>
+            </a:r>
+            <a:r>
+              <a:rPr lang="en-US" sz="900" kern="1200" dirty="0" smtClean="0">
+                <a:solidFill>
+                  <a:schemeClr val="tx1"/>
+                </a:solidFill>
+                <a:effectLst/>
+                <a:latin typeface="+mn-lt"/>
+                <a:ea typeface="+mn-ea"/>
+                <a:cs typeface="+mn-cs"/>
+              </a:rPr>
+              <a:t> or </a:t>
+            </a:r>
+            <a:r>
+              <a:rPr lang="en-US" sz="900" i="1" kern="1200" dirty="0" smtClean="0">
+                <a:solidFill>
+                  <a:schemeClr val="tx1"/>
+                </a:solidFill>
+                <a:effectLst/>
+                <a:latin typeface="+mn-lt"/>
+                <a:ea typeface="+mn-ea"/>
+                <a:cs typeface="+mn-cs"/>
+              </a:rPr>
+              <a:t>stopped</a:t>
+            </a:r>
+            <a:r>
+              <a:rPr lang="en-US" sz="900" kern="1200" dirty="0" smtClean="0">
+                <a:solidFill>
+                  <a:schemeClr val="tx1"/>
+                </a:solidFill>
+                <a:effectLst/>
+                <a:latin typeface="+mn-lt"/>
+                <a:ea typeface="+mn-ea"/>
+                <a:cs typeface="+mn-cs"/>
+              </a:rPr>
+              <a:t>). There are several actions possible on these resources:</a:t>
+            </a:r>
+          </a:p>
+          <a:p>
+            <a:pPr lvl="0"/>
+            <a:r>
+              <a:rPr lang="en-US" sz="900" kern="1200" dirty="0" smtClean="0">
+                <a:solidFill>
+                  <a:schemeClr val="tx1"/>
+                </a:solidFill>
+                <a:effectLst/>
+                <a:latin typeface="+mn-lt"/>
+                <a:ea typeface="+mn-ea"/>
+                <a:cs typeface="+mn-cs"/>
+              </a:rPr>
+              <a:t>Terminate on any listed resource which must terminate instance</a:t>
+            </a:r>
+          </a:p>
+          <a:p>
+            <a:pPr lvl="0"/>
+            <a:r>
+              <a:rPr lang="en-US" sz="900" kern="1200" dirty="0" smtClean="0">
+                <a:solidFill>
+                  <a:schemeClr val="tx1"/>
+                </a:solidFill>
+                <a:effectLst/>
+                <a:latin typeface="+mn-lt"/>
+                <a:ea typeface="+mn-ea"/>
+                <a:cs typeface="+mn-cs"/>
+              </a:rPr>
+              <a:t>Stop on running company or Start on stopped instance</a:t>
+            </a:r>
+          </a:p>
+          <a:p>
+            <a:pPr lvl="0"/>
+            <a:r>
+              <a:rPr lang="en-US" sz="900" kern="1200" dirty="0" smtClean="0">
+                <a:solidFill>
+                  <a:schemeClr val="tx1"/>
+                </a:solidFill>
+                <a:effectLst/>
+                <a:latin typeface="+mn-lt"/>
+                <a:ea typeface="+mn-ea"/>
+                <a:cs typeface="+mn-cs"/>
+              </a:rPr>
+              <a:t>Deploy EMR creates and assign specific EMR to associated box; it’s possible to deploy several EMR cluster</a:t>
             </a:r>
             <a:r>
               <a:rPr lang="en-US" sz="900" kern="1200" baseline="0" dirty="0" smtClean="0">
@@ -12491,7 +12947,78 @@
                 <a:ea typeface="+mn-ea"/>
                 <a:cs typeface="+mn-cs"/>
               </a:rPr>
-              <a:t> page</a:t>
+              <a:t> for one box, and all these clusters will be listed under box description with terminate button each</a:t>
+            </a:r>
+            <a:endParaRPr lang="en-US" sz="900" kern="1200" dirty="0" smtClean="0">
+              <a:solidFill>
+                <a:schemeClr val="tx1"/>
+              </a:solidFill>
+              <a:effectLst/>
+              <a:latin typeface="+mn-lt"/>
+              <a:ea typeface="+mn-ea"/>
+              <a:cs typeface="+mn-cs"/>
+            </a:endParaRPr>
+          </a:p>
+          <a:p>
+            <a:r>
+              <a:rPr lang="en-US" sz="900" kern="1200" dirty="0" smtClean="0">
+                <a:solidFill>
+                  <a:schemeClr val="tx1"/>
+                </a:solidFill>
+                <a:effectLst/>
+                <a:latin typeface="+mn-lt"/>
+                <a:ea typeface="+mn-ea"/>
+                <a:cs typeface="+mn-cs"/>
+              </a:rPr>
+              <a:t>At the bottom, there is </a:t>
+            </a:r>
+            <a:r>
+              <a:rPr lang="en-US" sz="900" i="1" kern="1200" dirty="0" smtClean="0">
+                <a:solidFill>
+                  <a:schemeClr val="tx1"/>
+                </a:solidFill>
+                <a:effectLst/>
+                <a:latin typeface="+mn-lt"/>
+                <a:ea typeface="+mn-ea"/>
+                <a:cs typeface="+mn-cs"/>
+              </a:rPr>
+              <a:t>Create new</a:t>
+            </a:r>
+            <a:r>
+              <a:rPr lang="en-US" sz="900" kern="1200" dirty="0" smtClean="0">
+                <a:solidFill>
+                  <a:schemeClr val="tx1"/>
+                </a:solidFill>
+                <a:effectLst/>
+                <a:latin typeface="+mn-lt"/>
+                <a:ea typeface="+mn-ea"/>
+                <a:cs typeface="+mn-cs"/>
+              </a:rPr>
+              <a:t> button </a:t>
+            </a:r>
+            <a:r>
+              <a:rPr lang="en-US" sz="900" kern="1200" dirty="0" err="1" smtClean="0">
+                <a:solidFill>
+                  <a:schemeClr val="tx1"/>
+                </a:solidFill>
+                <a:effectLst/>
+                <a:latin typeface="+mn-lt"/>
+                <a:ea typeface="+mn-ea"/>
+                <a:cs typeface="+mn-cs"/>
+              </a:rPr>
+              <a:t>wich</a:t>
+            </a:r>
+            <a:r>
+              <a:rPr lang="en-US" sz="900" kern="1200" dirty="0" smtClean="0">
+                <a:solidFill>
+                  <a:schemeClr val="tx1"/>
+                </a:solidFill>
+                <a:effectLst/>
+                <a:latin typeface="+mn-lt"/>
+                <a:ea typeface="+mn-ea"/>
+                <a:cs typeface="+mn-cs"/>
+              </a:rPr>
+              <a:t> opens popup/new page depictured on the next slide</a:t>
             </a:r>
             <a:endParaRPr lang="en-US" dirty="0"/>
           </a:p>
@@ -12514,7 +13041,7 @@
           <a:p>
             <a:fld id="{7AE90029-A909-AD4E-9775-A0D64990AD22}" type="slidenum">
               <a:rPr lang="en-US" smtClean="0"/>
-              <a:t>18</a:t>
+              <a:t>19</a:t>
             </a:fld>
             <a:endParaRPr lang="en-US"/>
           </a:p>
@@ -12523,7 +13050,7 @@
     </p:spTree>
     <p:extLst>
       <p:ext uri="{BB962C8B-B14F-4D97-AF65-F5344CB8AC3E}">
-        <p14:creationId xmlns:p14="http://schemas.microsoft.com/office/powerpoint/2010/main" val="1540994898"/>
+        <p14:creationId xmlns:p14="http://schemas.microsoft.com/office/powerpoint/2010/main" val="2738975723"/>
       </p:ext>
     </p:extLst>
   </p:cSld>
@@ -12578,264 +13105,8 @@
           <a:lstStyle/>
           <a:p>
             <a:r>
-              <a:rPr lang="en-US" sz="900" kern="1200" dirty="0" smtClean="0">
-                <a:solidFill>
-                  <a:schemeClr val="tx1"/>
-                </a:solidFill>
-                <a:effectLst/>
-                <a:latin typeface="+mn-lt"/>
-                <a:ea typeface="+mn-ea"/>
-                <a:cs typeface="+mn-cs"/>
-              </a:rPr>
-              <a:t>Also, the page Figure 2 List resources is display to user with preconfigured </a:t>
-            </a:r>
-            <a:r>
-              <a:rPr lang="en-US" sz="900" kern="1200" dirty="0" err="1" smtClean="0">
-                <a:solidFill>
-                  <a:schemeClr val="tx1"/>
-                </a:solidFill>
-                <a:effectLst/>
-                <a:latin typeface="+mn-lt"/>
-                <a:ea typeface="+mn-ea"/>
-                <a:cs typeface="+mn-cs"/>
-              </a:rPr>
-              <a:t>env</a:t>
-            </a:r>
-            <a:r>
-              <a:rPr lang="en-US" sz="900" kern="1200" dirty="0" smtClean="0">
-                <a:solidFill>
-                  <a:schemeClr val="tx1"/>
-                </a:solidFill>
-                <a:effectLst/>
-                <a:latin typeface="+mn-lt"/>
-                <a:ea typeface="+mn-ea"/>
-                <a:cs typeface="+mn-cs"/>
-              </a:rPr>
-              <a:t> (subnet, storage, </a:t>
-            </a:r>
-            <a:r>
-              <a:rPr lang="en-US" sz="900" kern="1200" dirty="0" err="1" smtClean="0">
-                <a:solidFill>
-                  <a:schemeClr val="tx1"/>
-                </a:solidFill>
-                <a:effectLst/>
-                <a:latin typeface="+mn-lt"/>
-                <a:ea typeface="+mn-ea"/>
-                <a:cs typeface="+mn-cs"/>
-              </a:rPr>
-              <a:t>etc</a:t>
-            </a:r>
-            <a:r>
-              <a:rPr lang="en-US" sz="900" kern="1200" dirty="0" smtClean="0">
-                <a:solidFill>
-                  <a:schemeClr val="tx1"/>
-                </a:solidFill>
-                <a:effectLst/>
-                <a:latin typeface="+mn-lt"/>
-                <a:ea typeface="+mn-ea"/>
-                <a:cs typeface="+mn-cs"/>
-              </a:rPr>
-              <a:t>, so user is not the first time here and already registered vital components). On this page user can see short description of running resources like resource name, resource size (shape for EC2 instance and number of slaves X shape of slave for EMR) and status of resource (which can be </a:t>
-            </a:r>
-            <a:r>
-              <a:rPr lang="en-US" sz="900" i="1" kern="1200" dirty="0" smtClean="0">
-                <a:solidFill>
-                  <a:schemeClr val="tx1"/>
-                </a:solidFill>
-                <a:effectLst/>
-                <a:latin typeface="+mn-lt"/>
-                <a:ea typeface="+mn-ea"/>
-                <a:cs typeface="+mn-cs"/>
-              </a:rPr>
-              <a:t>running</a:t>
-            </a:r>
-            <a:r>
-              <a:rPr lang="en-US" sz="900" kern="1200" dirty="0" smtClean="0">
-                <a:solidFill>
-                  <a:schemeClr val="tx1"/>
-                </a:solidFill>
-                <a:effectLst/>
-                <a:latin typeface="+mn-lt"/>
-                <a:ea typeface="+mn-ea"/>
-                <a:cs typeface="+mn-cs"/>
-              </a:rPr>
-              <a:t> or </a:t>
-            </a:r>
-            <a:r>
-              <a:rPr lang="en-US" sz="900" i="1" kern="1200" dirty="0" smtClean="0">
-                <a:solidFill>
-                  <a:schemeClr val="tx1"/>
-                </a:solidFill>
-                <a:effectLst/>
-                <a:latin typeface="+mn-lt"/>
-                <a:ea typeface="+mn-ea"/>
-                <a:cs typeface="+mn-cs"/>
-              </a:rPr>
-              <a:t>stopped</a:t>
-            </a:r>
-            <a:r>
-              <a:rPr lang="en-US" sz="900" kern="1200" dirty="0" smtClean="0">
-                <a:solidFill>
-                  <a:schemeClr val="tx1"/>
-                </a:solidFill>
-                <a:effectLst/>
-                <a:latin typeface="+mn-lt"/>
-                <a:ea typeface="+mn-ea"/>
-                <a:cs typeface="+mn-cs"/>
-              </a:rPr>
-              <a:t>). There are </a:t>
-            </a:r>
-            <a:r>
-              <a:rPr lang="en-US" sz="900" kern="1200" dirty="0" smtClean="0">
-                <a:solidFill>
-                  <a:schemeClr val="tx1"/>
-                </a:solidFill>
-                <a:effectLst/>
-                <a:latin typeface="+mn-lt"/>
-                <a:ea typeface="+mn-ea"/>
-                <a:cs typeface="+mn-cs"/>
-              </a:rPr>
-              <a:t>several </a:t>
-            </a:r>
-            <a:r>
-              <a:rPr lang="en-US" sz="900" kern="1200" dirty="0" smtClean="0">
-                <a:solidFill>
-                  <a:schemeClr val="tx1"/>
-                </a:solidFill>
-                <a:effectLst/>
-                <a:latin typeface="+mn-lt"/>
-                <a:ea typeface="+mn-ea"/>
-                <a:cs typeface="+mn-cs"/>
-              </a:rPr>
-              <a:t>actions possible on these resources:</a:t>
-            </a:r>
-          </a:p>
-          <a:p>
-            <a:pPr lvl="0"/>
-            <a:r>
-              <a:rPr lang="en-US" sz="900" kern="1200" dirty="0" smtClean="0">
-                <a:solidFill>
-                  <a:schemeClr val="tx1"/>
-                </a:solidFill>
-                <a:effectLst/>
-                <a:latin typeface="+mn-lt"/>
-                <a:ea typeface="+mn-ea"/>
-                <a:cs typeface="+mn-cs"/>
-              </a:rPr>
-              <a:t>Terminate on any listed resource which must terminate instance</a:t>
-            </a:r>
-          </a:p>
-          <a:p>
-            <a:pPr lvl="0"/>
-            <a:r>
-              <a:rPr lang="en-US" sz="900" kern="1200" dirty="0" smtClean="0">
-                <a:solidFill>
-                  <a:schemeClr val="tx1"/>
-                </a:solidFill>
-                <a:effectLst/>
-                <a:latin typeface="+mn-lt"/>
-                <a:ea typeface="+mn-ea"/>
-                <a:cs typeface="+mn-cs"/>
-              </a:rPr>
-              <a:t>Stop on running company or Start on stopped instance</a:t>
-            </a:r>
-          </a:p>
-          <a:p>
-            <a:pPr lvl="0"/>
-            <a:r>
-              <a:rPr lang="en-US" sz="900" kern="1200" dirty="0" smtClean="0">
-                <a:solidFill>
-                  <a:schemeClr val="tx1"/>
-                </a:solidFill>
-                <a:effectLst/>
-                <a:latin typeface="+mn-lt"/>
-                <a:ea typeface="+mn-ea"/>
-                <a:cs typeface="+mn-cs"/>
-              </a:rPr>
-              <a:t>Deploy EMR creates and assign specific EMR to associated box; it’s possible to deploy several EMR cluster</a:t>
-            </a:r>
-            <a:r>
-              <a:rPr lang="en-US" sz="900" kern="1200" baseline="0" dirty="0" smtClean="0">
-                <a:solidFill>
-                  <a:schemeClr val="tx1"/>
-                </a:solidFill>
-                <a:effectLst/>
-                <a:latin typeface="+mn-lt"/>
-                <a:ea typeface="+mn-ea"/>
-                <a:cs typeface="+mn-cs"/>
-              </a:rPr>
-              <a:t> for one box, and all these clusters will be listed under box description with terminate button each</a:t>
-            </a:r>
-            <a:endParaRPr lang="en-US" sz="900" kern="1200" dirty="0" smtClean="0">
-              <a:solidFill>
-                <a:schemeClr val="tx1"/>
-              </a:solidFill>
-              <a:effectLst/>
-              <a:latin typeface="+mn-lt"/>
-              <a:ea typeface="+mn-ea"/>
-              <a:cs typeface="+mn-cs"/>
-            </a:endParaRPr>
-          </a:p>
-          <a:p>
-            <a:r>
-              <a:rPr lang="en-US" sz="900" kern="1200" dirty="0" smtClean="0">
-                <a:solidFill>
-                  <a:schemeClr val="tx1"/>
-                </a:solidFill>
-                <a:effectLst/>
-                <a:latin typeface="+mn-lt"/>
-                <a:ea typeface="+mn-ea"/>
-                <a:cs typeface="+mn-cs"/>
-              </a:rPr>
-              <a:t>At the bottom, there is </a:t>
-            </a:r>
-            <a:r>
-              <a:rPr lang="en-US" sz="900" i="1" kern="1200" dirty="0" smtClean="0">
-                <a:solidFill>
-                  <a:schemeClr val="tx1"/>
-                </a:solidFill>
-                <a:effectLst/>
-                <a:latin typeface="+mn-lt"/>
-                <a:ea typeface="+mn-ea"/>
-                <a:cs typeface="+mn-cs"/>
-              </a:rPr>
-              <a:t>Create new</a:t>
-            </a:r>
-            <a:r>
-              <a:rPr lang="en-US" sz="900" kern="1200" dirty="0" smtClean="0">
-                <a:solidFill>
-                  <a:schemeClr val="tx1"/>
-                </a:solidFill>
-                <a:effectLst/>
-                <a:latin typeface="+mn-lt"/>
-                <a:ea typeface="+mn-ea"/>
-                <a:cs typeface="+mn-cs"/>
-              </a:rPr>
-              <a:t> button </a:t>
-            </a:r>
-            <a:r>
-              <a:rPr lang="en-US" sz="900" kern="1200" dirty="0" err="1" smtClean="0">
-                <a:solidFill>
-                  <a:schemeClr val="tx1"/>
-                </a:solidFill>
-                <a:effectLst/>
-                <a:latin typeface="+mn-lt"/>
-                <a:ea typeface="+mn-ea"/>
-                <a:cs typeface="+mn-cs"/>
-              </a:rPr>
-              <a:t>wich</a:t>
-            </a:r>
-            <a:r>
-              <a:rPr lang="en-US" sz="900" kern="1200" dirty="0" smtClean="0">
-                <a:solidFill>
-                  <a:schemeClr val="tx1"/>
-                </a:solidFill>
-                <a:effectLst/>
-                <a:latin typeface="+mn-lt"/>
-                <a:ea typeface="+mn-ea"/>
-                <a:cs typeface="+mn-cs"/>
-              </a:rPr>
-              <a:t> opens popup/new page depictured on the next slide</a:t>
+              <a:rPr lang="en-US" dirty="0" smtClean="0"/>
+              <a:t>Template description is a description for each specific template from dropdown. List of templates can be filtered on backend for specific user. User needs to specify name and select instance shape</a:t>
             </a:r>
             <a:endParaRPr lang="en-US" dirty="0"/>
           </a:p>
@@ -12858,7 +13129,7 @@
           <a:p>
             <a:fld id="{7AE90029-A909-AD4E-9775-A0D64990AD22}" type="slidenum">
               <a:rPr lang="en-US" smtClean="0"/>
-              <a:t>19</a:t>
+              <a:t>20</a:t>
             </a:fld>
             <a:endParaRPr lang="en-US"/>
           </a:p>
@@ -12867,7 +13138,7 @@
     </p:spTree>
     <p:extLst>
       <p:ext uri="{BB962C8B-B14F-4D97-AF65-F5344CB8AC3E}">
-        <p14:creationId xmlns:p14="http://schemas.microsoft.com/office/powerpoint/2010/main" val="2738975723"/>
+        <p14:creationId xmlns:p14="http://schemas.microsoft.com/office/powerpoint/2010/main" val="1027643576"/>
       </p:ext>
     </p:extLst>
   </p:cSld>
@@ -12923,9 +13194,17 @@
           <a:p>
             <a:r>
               <a:rPr lang="en-US" dirty="0" smtClean="0"/>
-              <a:t>Template description is a description for each specific template from dropdown. List of templates can be filtered on backend for specific user. User needs to specify name and select instance shape</a:t>
-            </a:r>
-            <a:endParaRPr lang="en-US" dirty="0"/>
+              <a:t>Show all information that is available</a:t>
+            </a:r>
+            <a:r>
+              <a:rPr lang="en-US" baseline="0" dirty="0" smtClean="0"/>
+              <a:t> </a:t>
+            </a:r>
+            <a:r>
+              <a:rPr lang="en-US" baseline="0" smtClean="0"/>
+              <a:t>about instance</a:t>
+            </a:r>
+            <a:endParaRPr lang="en-US"/>
           </a:p>
         </p:txBody>
       </p:sp>
@@ -12946,7 +13225,7 @@
           <a:p>
             <a:fld id="{7AE90029-A909-AD4E-9775-A0D64990AD22}" type="slidenum">
               <a:rPr lang="en-US" smtClean="0"/>
-              <a:t>20</a:t>
+              <a:t>22</a:t>
             </a:fld>
             <a:endParaRPr lang="en-US"/>
           </a:p>
@@ -12955,7 +13234,7 @@
     </p:spTree>
     <p:extLst>
       <p:ext uri="{BB962C8B-B14F-4D97-AF65-F5344CB8AC3E}">
-        <p14:creationId xmlns:p14="http://schemas.microsoft.com/office/powerpoint/2010/main" val="1027643576"/>
+        <p14:creationId xmlns:p14="http://schemas.microsoft.com/office/powerpoint/2010/main" val="3378371515"/>
       </p:ext>
     </p:extLst>
   </p:cSld>
@@ -13009,19 +13288,7 @@
           <a:bodyPr/>
           <a:lstStyle/>
           <a:p>
-            <a:r>
-              <a:rPr lang="en-US" dirty="0" smtClean="0"/>
-              <a:t>Show all information that is available</a:t>
-            </a:r>
-            <a:r>
-              <a:rPr lang="en-US" baseline="0" dirty="0" smtClean="0"/>
-              <a:t> </a:t>
-            </a:r>
-            <a:r>
-              <a:rPr lang="en-US" baseline="0" smtClean="0"/>
-              <a:t>about instance</a:t>
-            </a:r>
-            <a:endParaRPr lang="en-US"/>
+            <a:endParaRPr lang="en-US" dirty="0"/>
           </a:p>
         </p:txBody>
       </p:sp>
@@ -13042,7 +13309,7 @@
           <a:p>
             <a:fld id="{7AE90029-A909-AD4E-9775-A0D64990AD22}" type="slidenum">
               <a:rPr lang="en-US" smtClean="0"/>
-              <a:t>22</a:t>
+              <a:t>24</a:t>
             </a:fld>
             <a:endParaRPr lang="en-US"/>
           </a:p>
@@ -13051,7 +13318,7 @@
     </p:spTree>
     <p:extLst>
       <p:ext uri="{BB962C8B-B14F-4D97-AF65-F5344CB8AC3E}">
-        <p14:creationId xmlns:p14="http://schemas.microsoft.com/office/powerpoint/2010/main" val="3378371515"/>
+        <p14:creationId xmlns:p14="http://schemas.microsoft.com/office/powerpoint/2010/main" val="244375185"/>
       </p:ext>
     </p:extLst>
   </p:cSld>
@@ -13126,7 +13393,7 @@
           <a:p>
             <a:fld id="{7AE90029-A909-AD4E-9775-A0D64990AD22}" type="slidenum">
               <a:rPr lang="en-US" smtClean="0"/>
-              <a:t>24</a:t>
+              <a:t>25</a:t>
             </a:fld>
             <a:endParaRPr lang="en-US"/>
           </a:p>
@@ -13135,7 +13402,7 @@
     </p:spTree>
     <p:extLst>
       <p:ext uri="{BB962C8B-B14F-4D97-AF65-F5344CB8AC3E}">
-        <p14:creationId xmlns:p14="http://schemas.microsoft.com/office/powerpoint/2010/main" val="244375185"/>
+        <p14:creationId xmlns:p14="http://schemas.microsoft.com/office/powerpoint/2010/main" val="927281347"/>
       </p:ext>
     </p:extLst>
   </p:cSld>
@@ -13210,7 +13477,7 @@
           <a:p>
             <a:fld id="{7AE90029-A909-AD4E-9775-A0D64990AD22}" type="slidenum">
               <a:rPr lang="en-US" smtClean="0"/>
-              <a:t>25</a:t>
+              <a:t>26</a:t>
             </a:fld>
             <a:endParaRPr lang="en-US"/>
           </a:p>
@@ -13219,7 +13486,7 @@
     </p:spTree>
     <p:extLst>
       <p:ext uri="{BB962C8B-B14F-4D97-AF65-F5344CB8AC3E}">
-        <p14:creationId xmlns:p14="http://schemas.microsoft.com/office/powerpoint/2010/main" val="927281347"/>
+        <p14:creationId xmlns:p14="http://schemas.microsoft.com/office/powerpoint/2010/main" val="2073136491"/>
       </p:ext>
     </p:extLst>
   </p:cSld>
@@ -13294,7 +13561,7 @@
           <a:p>
             <a:fld id="{7AE90029-A909-AD4E-9775-A0D64990AD22}" type="slidenum">
               <a:rPr lang="en-US" smtClean="0"/>
-              <a:t>2</a:t>
+              <a:t>3</a:t>
             </a:fld>
             <a:endParaRPr lang="en-US"/>
           </a:p>
@@ -13303,7 +13570,7 @@
     </p:spTree>
     <p:extLst>
       <p:ext uri="{BB962C8B-B14F-4D97-AF65-F5344CB8AC3E}">
-        <p14:creationId xmlns:p14="http://schemas.microsoft.com/office/powerpoint/2010/main" val="483939224"/>
+        <p14:creationId xmlns:p14="http://schemas.microsoft.com/office/powerpoint/2010/main" val="373107636"/>
       </p:ext>
     </p:extLst>
   </p:cSld>
@@ -13378,7 +13645,7 @@
           <a:p>
             <a:fld id="{7AE90029-A909-AD4E-9775-A0D64990AD22}" type="slidenum">
               <a:rPr lang="en-US" smtClean="0"/>
-              <a:t>26</a:t>
+              <a:t>27</a:t>
             </a:fld>
             <a:endParaRPr lang="en-US"/>
           </a:p>
@@ -13387,7 +13654,7 @@
     </p:spTree>
     <p:extLst>
       <p:ext uri="{BB962C8B-B14F-4D97-AF65-F5344CB8AC3E}">
-        <p14:creationId xmlns:p14="http://schemas.microsoft.com/office/powerpoint/2010/main" val="2073136491"/>
+        <p14:creationId xmlns:p14="http://schemas.microsoft.com/office/powerpoint/2010/main" val="507526841"/>
       </p:ext>
     </p:extLst>
   </p:cSld>
@@ -13462,90 +13729,6 @@
           <a:p>
             <a:fld id="{7AE90029-A909-AD4E-9775-A0D64990AD22}" type="slidenum">
               <a:rPr lang="en-US" smtClean="0"/>
-              <a:t>27</a:t>
-            </a:fld>
-            <a:endParaRPr lang="en-US"/>
-          </a:p>
-        </p:txBody>
-      </p:sp>
-    </p:spTree>
-    <p:extLst>
-      <p:ext uri="{BB962C8B-B14F-4D97-AF65-F5344CB8AC3E}">
-        <p14:creationId xmlns:p14="http://schemas.microsoft.com/office/powerpoint/2010/main" val="507526841"/>
-      </p:ext>
-    </p:extLst>
-  </p:cSld>
-  <p:clrMapOvr>
-    <a:masterClrMapping/>
-  </p:clrMapOvr>
-</p:notes>
-</file>
-
-<file path=ppt/notesSlides/notesSlide22.xml><?xml version="1.0" encoding="utf-8"?>
-<p:notes xmlns:a="http://schemas.openxmlformats.org/drawingml/2006/main" xmlns:r="http://schemas.openxmlformats.org/officeDocument/2006/relationships" xmlns:p="http://schemas.openxmlformats.org/presentationml/2006/main">
-  <p:cSld>
-    <p:spTree>
-      <p:nvGrpSpPr>
-        <p:cNvPr id="1" name=""/>
-        <p:cNvGrpSpPr/>
-        <p:nvPr/>
-      </p:nvGrpSpPr>
-      <p:grpSpPr>
-        <a:xfrm>
-          <a:off x="0" y="0"/>
-          <a:ext cx="0" cy="0"/>
-          <a:chOff x="0" y="0"/>
-          <a:chExt cx="0" cy="0"/>
-        </a:xfrm>
-      </p:grpSpPr>
-      <p:sp>
-        <p:nvSpPr>
-          <p:cNvPr id="2" name="Slide Image Placeholder 1"/>
-          <p:cNvSpPr>
-            <a:spLocks noGrp="1" noRot="1" noChangeAspect="1"/>
-          </p:cNvSpPr>
-          <p:nvPr>
-            <p:ph type="sldImg"/>
-          </p:nvPr>
-        </p:nvSpPr>
-        <p:spPr/>
-      </p:sp>
-      <p:sp>
-        <p:nvSpPr>
-          <p:cNvPr id="3" name="Notes Placeholder 2"/>
-          <p:cNvSpPr>
-            <a:spLocks noGrp="1"/>
-          </p:cNvSpPr>
-          <p:nvPr>
-            <p:ph type="body" idx="1"/>
-          </p:nvPr>
-        </p:nvSpPr>
-        <p:spPr/>
-        <p:txBody>
-          <a:bodyPr/>
-          <a:lstStyle/>
-          <a:p>
-            <a:endParaRPr lang="en-US" dirty="0"/>
-          </a:p>
-        </p:txBody>
-      </p:sp>
-      <p:sp>
-        <p:nvSpPr>
-          <p:cNvPr id="4" name="Slide Number Placeholder 3"/>
-          <p:cNvSpPr>
-            <a:spLocks noGrp="1"/>
-          </p:cNvSpPr>
-          <p:nvPr>
-            <p:ph type="sldNum" sz="quarter" idx="10"/>
-          </p:nvPr>
-        </p:nvSpPr>
-        <p:spPr/>
-        <p:txBody>
-          <a:bodyPr/>
-          <a:lstStyle/>
-          <a:p>
-            <a:fld id="{7AE90029-A909-AD4E-9775-A0D64990AD22}" type="slidenum">
-              <a:rPr lang="en-US" smtClean="0"/>
               <a:t>28</a:t>
             </a:fld>
             <a:endParaRPr lang="en-US"/>
@@ -13565,7 +13748,7 @@
 </p:notes>
 </file>
 
-<file path=ppt/notesSlides/notesSlide23.xml><?xml version="1.0" encoding="utf-8"?>
+<file path=ppt/notesSlides/notesSlide22.xml><?xml version="1.0" encoding="utf-8"?>
 <p:notes xmlns:a="http://schemas.openxmlformats.org/drawingml/2006/main" xmlns:r="http://schemas.openxmlformats.org/officeDocument/2006/relationships" xmlns:p="http://schemas.openxmlformats.org/presentationml/2006/main">
   <p:cSld>
     <p:spTree>
@@ -13714,7 +13897,7 @@
           <a:p>
             <a:fld id="{7AE90029-A909-AD4E-9775-A0D64990AD22}" type="slidenum">
               <a:rPr lang="en-US" smtClean="0"/>
-              <a:t>3</a:t>
+              <a:t>4</a:t>
             </a:fld>
             <a:endParaRPr lang="en-US"/>
           </a:p>
@@ -13723,7 +13906,7 @@
     </p:spTree>
     <p:extLst>
       <p:ext uri="{BB962C8B-B14F-4D97-AF65-F5344CB8AC3E}">
-        <p14:creationId xmlns:p14="http://schemas.microsoft.com/office/powerpoint/2010/main" val="373107636"/>
+        <p14:creationId xmlns:p14="http://schemas.microsoft.com/office/powerpoint/2010/main" val="1339374301"/>
       </p:ext>
     </p:extLst>
   </p:cSld>
@@ -13798,7 +13981,7 @@
           <a:p>
             <a:fld id="{7AE90029-A909-AD4E-9775-A0D64990AD22}" type="slidenum">
               <a:rPr lang="en-US" smtClean="0"/>
-              <a:t>4</a:t>
+              <a:t>5</a:t>
             </a:fld>
             <a:endParaRPr lang="en-US"/>
           </a:p>
@@ -13807,7 +13990,7 @@
     </p:spTree>
     <p:extLst>
       <p:ext uri="{BB962C8B-B14F-4D97-AF65-F5344CB8AC3E}">
-        <p14:creationId xmlns:p14="http://schemas.microsoft.com/office/powerpoint/2010/main" val="1339374301"/>
+        <p14:creationId xmlns:p14="http://schemas.microsoft.com/office/powerpoint/2010/main" val="1494692032"/>
       </p:ext>
     </p:extLst>
   </p:cSld>
@@ -13882,7 +14065,7 @@
           <a:p>
             <a:fld id="{7AE90029-A909-AD4E-9775-A0D64990AD22}" type="slidenum">
               <a:rPr lang="en-US" smtClean="0"/>
-              <a:t>5</a:t>
+              <a:t>6</a:t>
             </a:fld>
             <a:endParaRPr lang="en-US"/>
           </a:p>
@@ -13891,7 +14074,7 @@
     </p:spTree>
     <p:extLst>
       <p:ext uri="{BB962C8B-B14F-4D97-AF65-F5344CB8AC3E}">
-        <p14:creationId xmlns:p14="http://schemas.microsoft.com/office/powerpoint/2010/main" val="1494692032"/>
+        <p14:creationId xmlns:p14="http://schemas.microsoft.com/office/powerpoint/2010/main" val="1611298283"/>
       </p:ext>
     </p:extLst>
   </p:cSld>
@@ -13966,7 +14149,7 @@
           <a:p>
             <a:fld id="{7AE90029-A909-AD4E-9775-A0D64990AD22}" type="slidenum">
               <a:rPr lang="en-US" smtClean="0"/>
-              <a:t>6</a:t>
+              <a:t>7</a:t>
             </a:fld>
             <a:endParaRPr lang="en-US"/>
           </a:p>
@@ -13975,7 +14158,7 @@
     </p:spTree>
     <p:extLst>
       <p:ext uri="{BB962C8B-B14F-4D97-AF65-F5344CB8AC3E}">
-        <p14:creationId xmlns:p14="http://schemas.microsoft.com/office/powerpoint/2010/main" val="1611298283"/>
+        <p14:creationId xmlns:p14="http://schemas.microsoft.com/office/powerpoint/2010/main" val="1331053170"/>
       </p:ext>
     </p:extLst>
   </p:cSld>
@@ -14050,7 +14233,7 @@
           <a:p>
             <a:fld id="{7AE90029-A909-AD4E-9775-A0D64990AD22}" type="slidenum">
               <a:rPr lang="en-US" smtClean="0"/>
-              <a:t>7</a:t>
+              <a:t>8</a:t>
             </a:fld>
             <a:endParaRPr lang="en-US"/>
           </a:p>
@@ -14059,7 +14242,7 @@
     </p:spTree>
     <p:extLst>
       <p:ext uri="{BB962C8B-B14F-4D97-AF65-F5344CB8AC3E}">
-        <p14:creationId xmlns:p14="http://schemas.microsoft.com/office/powerpoint/2010/main" val="1331053170"/>
+        <p14:creationId xmlns:p14="http://schemas.microsoft.com/office/powerpoint/2010/main" val="285834087"/>
       </p:ext>
     </p:extLst>
   </p:cSld>
@@ -14113,6 +14296,55 @@
           <a:bodyPr/>
           <a:lstStyle/>
           <a:p>
+            <a:r>
+              <a:rPr lang="en-US" dirty="0" smtClean="0"/>
+              <a:t>Personal </a:t>
+            </a:r>
+            <a:r>
+              <a:rPr lang="en-US" dirty="0" err="1" smtClean="0"/>
+              <a:t>expl</a:t>
+            </a:r>
+            <a:r>
+              <a:rPr lang="en-US" dirty="0" smtClean="0"/>
+              <a:t> </a:t>
+            </a:r>
+            <a:r>
+              <a:rPr lang="en-US" dirty="0" err="1" smtClean="0"/>
+              <a:t>env</a:t>
+            </a:r>
+            <a:r>
+              <a:rPr lang="en-US" dirty="0" smtClean="0"/>
+              <a:t> and </a:t>
+            </a:r>
+            <a:r>
+              <a:rPr lang="en-US" baseline="0" dirty="0" smtClean="0"/>
+              <a:t>Collaboration space </a:t>
+            </a:r>
+            <a:r>
+              <a:rPr lang="en-US" dirty="0" smtClean="0"/>
+              <a:t>– a set of existing tools </a:t>
+            </a:r>
+          </a:p>
+          <a:p>
+            <a:r>
+              <a:rPr lang="en-US" dirty="0" smtClean="0"/>
+              <a:t>Self</a:t>
+            </a:r>
+            <a:r>
+              <a:rPr lang="en-US" baseline="0" dirty="0" smtClean="0"/>
+              <a:t> service – cornerstone, developed by </a:t>
+            </a:r>
+            <a:r>
+              <a:rPr lang="en-US" baseline="0" dirty="0" err="1" smtClean="0"/>
+              <a:t>epam</a:t>
+            </a:r>
+            <a:endParaRPr lang="en-US" baseline="0" dirty="0" smtClean="0"/>
+          </a:p>
+          <a:p>
+            <a:r>
+              <a:rPr lang="en-US" baseline="0" dirty="0" smtClean="0"/>
+              <a:t>- </a:t>
+            </a:r>
             <a:endParaRPr lang="en-US" dirty="0"/>
           </a:p>
         </p:txBody>
@@ -14134,7 +14366,7 @@
           <a:p>
             <a:fld id="{7AE90029-A909-AD4E-9775-A0D64990AD22}" type="slidenum">
               <a:rPr lang="en-US" smtClean="0"/>
-              <a:t>8</a:t>
+              <a:t>9</a:t>
             </a:fld>
             <a:endParaRPr lang="en-US"/>
           </a:p>
@@ -14143,7 +14375,7 @@
     </p:spTree>
     <p:extLst>
       <p:ext uri="{BB962C8B-B14F-4D97-AF65-F5344CB8AC3E}">
-        <p14:creationId xmlns:p14="http://schemas.microsoft.com/office/powerpoint/2010/main" val="285834087"/>
+        <p14:creationId xmlns:p14="http://schemas.microsoft.com/office/powerpoint/2010/main" val="2406307611"/>
       </p:ext>
     </p:extLst>
   </p:cSld>
@@ -14199,52 +14431,17 @@
           <a:p>
             <a:r>
               <a:rPr lang="en-US" dirty="0" smtClean="0"/>
-              <a:t>Personal </a:t>
-            </a:r>
-            <a:r>
-              <a:rPr lang="en-US" dirty="0" err="1" smtClean="0"/>
-              <a:t>expl</a:t>
-            </a:r>
-            <a:r>
-              <a:rPr lang="en-US" dirty="0" smtClean="0"/>
-              <a:t> </a:t>
-            </a:r>
-            <a:r>
-              <a:rPr lang="en-US" dirty="0" err="1" smtClean="0"/>
-              <a:t>env</a:t>
-            </a:r>
-            <a:r>
-              <a:rPr lang="en-US" dirty="0" smtClean="0"/>
-              <a:t> and </a:t>
+              <a:t>UI – friendly</a:t>
             </a:r>
             <a:r>
               <a:rPr lang="en-US" baseline="0" dirty="0" smtClean="0"/>
-              <a:t>Collaboration space </a:t>
-            </a:r>
-            <a:r>
-              <a:rPr lang="en-US" dirty="0" smtClean="0"/>
-              <a:t>– a set of existing tools </a:t>
-            </a:r>
-          </a:p>
-          <a:p>
-            <a:r>
-              <a:rPr lang="en-US" dirty="0" smtClean="0"/>
-              <a:t>Self</a:t>
-            </a:r>
+              <a:t> for DS</a:t>
+            </a:r>
+          </a:p>
+          <a:p>
             <a:r>
               <a:rPr lang="en-US" baseline="0" dirty="0" smtClean="0"/>
-              <a:t> service – cornerstone, developed by </a:t>
-            </a:r>
-            <a:r>
-              <a:rPr lang="en-US" baseline="0" dirty="0" err="1" smtClean="0"/>
-              <a:t>epam</a:t>
-            </a:r>
-            <a:endParaRPr lang="en-US" baseline="0" dirty="0" smtClean="0"/>
-          </a:p>
-          <a:p>
-            <a:r>
-              <a:rPr lang="en-US" baseline="0" dirty="0" smtClean="0"/>
-              <a:t>- </a:t>
+              <a:t>EM – inherit security model from enterprise</a:t>
             </a:r>
             <a:endParaRPr lang="en-US" dirty="0"/>
           </a:p>
@@ -14267,7 +14464,7 @@
           <a:p>
             <a:fld id="{7AE90029-A909-AD4E-9775-A0D64990AD22}" type="slidenum">
               <a:rPr lang="en-US" smtClean="0"/>
-              <a:t>9</a:t>
+              <a:t>10</a:t>
             </a:fld>
             <a:endParaRPr lang="en-US"/>
           </a:p>
@@ -14276,7 +14473,7 @@
     </p:spTree>
     <p:extLst>
       <p:ext uri="{BB962C8B-B14F-4D97-AF65-F5344CB8AC3E}">
-        <p14:creationId xmlns:p14="http://schemas.microsoft.com/office/powerpoint/2010/main" val="2406307611"/>
+        <p14:creationId xmlns:p14="http://schemas.microsoft.com/office/powerpoint/2010/main" val="826994066"/>
       </p:ext>
     </p:extLst>
   </p:cSld>
@@ -15914,7 +16111,7 @@
           <a:p>
             <a:fld id="{DCEE93CB-4BC3-44CE-A831-72F697F14A4E}" type="datetimeFigureOut">
               <a:rPr lang="en-US" smtClean="0"/>
-              <a:t>9/8/2016</a:t>
+              <a:t>9/14/2016</a:t>
             </a:fld>
             <a:endParaRPr lang="en-US"/>
           </a:p>
@@ -15982,6 +16179,280 @@
     <p:extLst>
       <p:ext uri="{BB962C8B-B14F-4D97-AF65-F5344CB8AC3E}">
         <p14:creationId xmlns:p14="http://schemas.microsoft.com/office/powerpoint/2010/main" val="714130269"/>
+      </p:ext>
+    </p:extLst>
+  </p:cSld>
+  <p:clrMapOvr>
+    <a:masterClrMapping/>
+  </p:clrMapOvr>
+</p:sldLayout>
+</file>
+
+<file path=ppt/slideLayouts/slideLayout4.xml><?xml version="1.0" encoding="utf-8"?>
+<p:sldLayout xmlns:a="http://schemas.openxmlformats.org/drawingml/2006/main" xmlns:r="http://schemas.openxmlformats.org/officeDocument/2006/relationships" xmlns:p="http://schemas.openxmlformats.org/presentationml/2006/main" userDrawn="1">
+  <p:cSld name="1_Title Slide">
+    <p:spTree>
+      <p:nvGrpSpPr>
+        <p:cNvPr id="1" name=""/>
+        <p:cNvGrpSpPr/>
+        <p:nvPr/>
+      </p:nvGrpSpPr>
+      <p:grpSpPr>
+        <a:xfrm>
+          <a:off x="0" y="0"/>
+          <a:ext cx="0" cy="0"/>
+          <a:chOff x="0" y="0"/>
+          <a:chExt cx="0" cy="0"/>
+        </a:xfrm>
+      </p:grpSpPr>
+      <p:sp>
+        <p:nvSpPr>
+          <p:cNvPr id="3" name="Picture Placeholder 2"/>
+          <p:cNvSpPr>
+            <a:spLocks noGrp="1"/>
+          </p:cNvSpPr>
+          <p:nvPr>
+            <p:ph type="pic" sz="quarter" idx="19"/>
+          </p:nvPr>
+        </p:nvSpPr>
+        <p:spPr>
+          <a:xfrm>
+            <a:off x="0" y="0"/>
+            <a:ext cx="9144000" cy="5143500"/>
+          </a:xfrm>
+          <a:prstGeom prst="rect">
+            <a:avLst/>
+          </a:prstGeom>
+        </p:spPr>
+        <p:txBody>
+          <a:bodyPr vert="horz" anchor="t"/>
+          <a:lstStyle>
+            <a:lvl1pPr marL="0" indent="0" algn="ctr">
+              <a:buNone/>
+              <a:defRPr baseline="0"/>
+            </a:lvl1pPr>
+          </a:lstStyle>
+          <a:p>
+            <a:endParaRPr lang="en-US" dirty="0" smtClean="0"/>
+          </a:p>
+          <a:p>
+            <a:r>
+              <a:rPr lang="en-US" dirty="0" smtClean="0"/>
+              <a:t>Background Image</a:t>
+            </a:r>
+            <a:endParaRPr lang="en-US" dirty="0"/>
+          </a:p>
+        </p:txBody>
+      </p:sp>
+      <p:sp>
+        <p:nvSpPr>
+          <p:cNvPr id="6" name="Text Placeholder 4"/>
+          <p:cNvSpPr>
+            <a:spLocks noGrp="1"/>
+          </p:cNvSpPr>
+          <p:nvPr>
+            <p:ph type="body" sz="quarter" idx="15" hasCustomPrompt="1"/>
+          </p:nvPr>
+        </p:nvSpPr>
+        <p:spPr>
+          <a:xfrm>
+            <a:off x="631825" y="1556683"/>
+            <a:ext cx="6910388" cy="470898"/>
+          </a:xfrm>
+          <a:prstGeom prst="rect">
+            <a:avLst/>
+          </a:prstGeom>
+        </p:spPr>
+        <p:txBody>
+          <a:bodyPr>
+            <a:spAutoFit/>
+          </a:bodyPr>
+          <a:lstStyle>
+            <a:lvl1pPr marL="0" indent="0">
+              <a:lnSpc>
+                <a:spcPct val="80000"/>
+              </a:lnSpc>
+              <a:spcBef>
+                <a:spcPts val="0"/>
+              </a:spcBef>
+              <a:buNone/>
+              <a:defRPr sz="3075" spc="-150">
+                <a:solidFill>
+                  <a:schemeClr val="bg1"/>
+                </a:solidFill>
+                <a:latin typeface="Arial Black"/>
+                <a:cs typeface="Arial Black"/>
+              </a:defRPr>
+            </a:lvl1pPr>
+            <a:lvl2pPr>
+              <a:defRPr sz="4500">
+                <a:latin typeface="Arial Black"/>
+                <a:cs typeface="Arial Black"/>
+              </a:defRPr>
+            </a:lvl2pPr>
+            <a:lvl3pPr>
+              <a:defRPr sz="4500">
+                <a:latin typeface="Arial Black"/>
+                <a:cs typeface="Arial Black"/>
+              </a:defRPr>
+            </a:lvl3pPr>
+            <a:lvl4pPr>
+              <a:defRPr sz="4500">
+                <a:latin typeface="Arial Black"/>
+                <a:cs typeface="Arial Black"/>
+              </a:defRPr>
+            </a:lvl4pPr>
+            <a:lvl5pPr>
+              <a:defRPr sz="4500">
+                <a:latin typeface="Arial Black"/>
+                <a:cs typeface="Arial Black"/>
+              </a:defRPr>
+            </a:lvl5pPr>
+          </a:lstStyle>
+          <a:p>
+            <a:pPr lvl="0"/>
+            <a:r>
+              <a:rPr lang="en-US" dirty="0" smtClean="0"/>
+              <a:t>CLICK TO ADD TITLE</a:t>
+            </a:r>
+          </a:p>
+        </p:txBody>
+      </p:sp>
+      <p:sp>
+        <p:nvSpPr>
+          <p:cNvPr id="10" name="Text Placeholder 7"/>
+          <p:cNvSpPr>
+            <a:spLocks noGrp="1"/>
+          </p:cNvSpPr>
+          <p:nvPr>
+            <p:ph type="body" sz="quarter" idx="16" hasCustomPrompt="1"/>
+          </p:nvPr>
+        </p:nvSpPr>
+        <p:spPr>
+          <a:xfrm>
+            <a:off x="631826" y="3340101"/>
+            <a:ext cx="6488113" cy="300082"/>
+          </a:xfrm>
+          <a:prstGeom prst="rect">
+            <a:avLst/>
+          </a:prstGeom>
+        </p:spPr>
+        <p:txBody>
+          <a:bodyPr>
+            <a:spAutoFit/>
+          </a:bodyPr>
+          <a:lstStyle>
+            <a:lvl1pPr marL="0" indent="0">
+              <a:lnSpc>
+                <a:spcPct val="100000"/>
+              </a:lnSpc>
+              <a:spcBef>
+                <a:spcPts val="0"/>
+              </a:spcBef>
+              <a:buFontTx/>
+              <a:buNone/>
+              <a:defRPr sz="1350">
+                <a:solidFill>
+                  <a:schemeClr val="bg1"/>
+                </a:solidFill>
+                <a:latin typeface="Arial Black"/>
+                <a:cs typeface="Arial Black"/>
+              </a:defRPr>
+            </a:lvl1pPr>
+          </a:lstStyle>
+          <a:p>
+            <a:pPr lvl="0"/>
+            <a:r>
+              <a:rPr lang="en-US" dirty="0" smtClean="0"/>
+              <a:t>CLICK TO ADD SUBTITLE</a:t>
+            </a:r>
+            <a:endParaRPr lang="en-US" dirty="0"/>
+          </a:p>
+        </p:txBody>
+      </p:sp>
+      <p:sp>
+        <p:nvSpPr>
+          <p:cNvPr id="11" name="Text Placeholder 11"/>
+          <p:cNvSpPr>
+            <a:spLocks noGrp="1"/>
+          </p:cNvSpPr>
+          <p:nvPr>
+            <p:ph type="body" sz="quarter" idx="17" hasCustomPrompt="1"/>
+          </p:nvPr>
+        </p:nvSpPr>
+        <p:spPr>
+          <a:xfrm>
+            <a:off x="631825" y="4094614"/>
+            <a:ext cx="3649662" cy="279797"/>
+          </a:xfrm>
+          <a:prstGeom prst="rect">
+            <a:avLst/>
+          </a:prstGeom>
+        </p:spPr>
+        <p:txBody>
+          <a:bodyPr>
+            <a:normAutofit/>
+          </a:bodyPr>
+          <a:lstStyle>
+            <a:lvl1pPr marL="0" indent="0">
+              <a:buNone/>
+              <a:defRPr sz="1350" baseline="0">
+                <a:solidFill>
+                  <a:schemeClr val="accent2"/>
+                </a:solidFill>
+              </a:defRPr>
+            </a:lvl1pPr>
+          </a:lstStyle>
+          <a:p>
+            <a:pPr lvl="0"/>
+            <a:r>
+              <a:rPr lang="en-US" dirty="0" smtClean="0"/>
+              <a:t>MONTH DATE, YEAR</a:t>
+            </a:r>
+            <a:endParaRPr lang="en-US" dirty="0"/>
+          </a:p>
+        </p:txBody>
+      </p:sp>
+      <p:sp>
+        <p:nvSpPr>
+          <p:cNvPr id="12" name="Picture Placeholder 2"/>
+          <p:cNvSpPr>
+            <a:spLocks noGrp="1"/>
+          </p:cNvSpPr>
+          <p:nvPr>
+            <p:ph type="pic" sz="quarter" idx="18" hasCustomPrompt="1"/>
+          </p:nvPr>
+        </p:nvSpPr>
+        <p:spPr>
+          <a:xfrm>
+            <a:off x="627880" y="378621"/>
+            <a:ext cx="1243502" cy="343678"/>
+          </a:xfrm>
+          <a:prstGeom prst="rect">
+            <a:avLst/>
+          </a:prstGeom>
+        </p:spPr>
+        <p:txBody>
+          <a:bodyPr vert="horz" lIns="68580" tIns="34290" rIns="68580" bIns="34290"/>
+          <a:lstStyle>
+            <a:lvl1pPr marL="0" indent="0" algn="ctr">
+              <a:buNone/>
+              <a:defRPr/>
+            </a:lvl1pPr>
+          </a:lstStyle>
+          <a:p>
+            <a:r>
+              <a:rPr lang="en-US" dirty="0" smtClean="0"/>
+              <a:t>logo</a:t>
+            </a:r>
+            <a:endParaRPr lang="en-US" dirty="0"/>
+          </a:p>
+        </p:txBody>
+      </p:sp>
+    </p:spTree>
+    <p:extLst>
+      <p:ext uri="{BB962C8B-B14F-4D97-AF65-F5344CB8AC3E}">
+        <p14:creationId xmlns:p14="http://schemas.microsoft.com/office/powerpoint/2010/main" val="3573800128"/>
       </p:ext>
     </p:extLst>
   </p:cSld>
@@ -16025,6 +16496,7 @@
     <p:sldLayoutId id="2147483742" r:id="rId1"/>
     <p:sldLayoutId id="2147484463" r:id="rId2"/>
     <p:sldLayoutId id="2147484464" r:id="rId3"/>
+    <p:sldLayoutId id="2147484465" r:id="rId4"/>
   </p:sldLayoutIdLst>
   <p:txStyles>
     <p:titleStyle>
@@ -16296,6 +16768,34 @@
           <a:chExt cx="0" cy="0"/>
         </a:xfrm>
       </p:grpSpPr>
+      <p:pic>
+        <p:nvPicPr>
+          <p:cNvPr id="7" name="Picture Placeholder 6"/>
+          <p:cNvPicPr>
+            <a:picLocks noGrp="1" noChangeAspect="1"/>
+          </p:cNvPicPr>
+          <p:nvPr>
+            <p:ph type="pic" sz="quarter" idx="19"/>
+          </p:nvPr>
+        </p:nvPicPr>
+        <p:blipFill rotWithShape="1">
+          <a:blip r:embed="rId2">
+            <a:extLst>
+              <a:ext uri="{28A0092B-C50C-407E-A947-70E740481C1C}">
+                <a14:useLocalDpi xmlns:a14="http://schemas.microsoft.com/office/drawing/2010/main" val="0"/>
+              </a:ext>
+            </a:extLst>
+          </a:blip>
+          <a:srcRect r="11459"/>
+          <a:stretch/>
+        </p:blipFill>
+        <p:spPr>
+          <a:xfrm flipH="1">
+            <a:off x="0" y="-1"/>
+            <a:ext cx="9144000" cy="5143502"/>
+          </a:xfrm>
+        </p:spPr>
+      </p:pic>
       <p:sp>
         <p:nvSpPr>
           <p:cNvPr id="2" name="Text Placeholder 1"/>
@@ -16303,88 +16803,141 @@
             <a:spLocks noGrp="1"/>
           </p:cNvSpPr>
           <p:nvPr>
-            <p:ph type="body" sz="quarter" idx="10"/>
+            <p:ph type="body" sz="quarter" idx="15"/>
           </p:nvPr>
         </p:nvSpPr>
-        <p:spPr/>
+        <p:spPr>
+          <a:xfrm>
+            <a:off x="627880" y="1984268"/>
+            <a:ext cx="7488986" cy="2012859"/>
+          </a:xfrm>
+        </p:spPr>
         <p:txBody>
           <a:bodyPr/>
           <a:lstStyle/>
           <a:p>
-            <a:endParaRPr lang="en-US" dirty="0"/>
+            <a:r>
+              <a:rPr lang="en-US" sz="3200" b="1" dirty="0"/>
+              <a:t>Data </a:t>
+            </a:r>
+            <a:r>
+              <a:rPr lang="en-US" sz="3200" b="1" dirty="0" smtClean="0"/>
+              <a:t>Lab</a:t>
+            </a:r>
+          </a:p>
+          <a:p>
+            <a:endParaRPr lang="en-US" sz="3200" b="1" dirty="0"/>
+          </a:p>
+          <a:p>
+            <a:r>
+              <a:rPr lang="en-US" sz="2000" dirty="0"/>
+              <a:t>Self-service, Fail-safe Exploratory Environment </a:t>
+            </a:r>
+          </a:p>
+          <a:p>
+            <a:r>
+              <a:rPr lang="en-US" sz="2000" dirty="0"/>
+              <a:t>for </a:t>
+            </a:r>
+          </a:p>
+          <a:p>
+            <a:r>
+              <a:rPr lang="en-US" sz="2000" dirty="0"/>
+              <a:t>Collaborative Data Science Workflow </a:t>
+            </a:r>
+          </a:p>
+          <a:p>
+            <a:endParaRPr lang="en-US" sz="3200" b="1" dirty="0"/>
           </a:p>
         </p:txBody>
       </p:sp>
       <p:sp>
         <p:nvSpPr>
-          <p:cNvPr id="3" name="TextBox 2"/>
-          <p:cNvSpPr txBox="1"/>
-          <p:nvPr/>
+          <p:cNvPr id="3" name="Text Placeholder 2"/>
+          <p:cNvSpPr>
+            <a:spLocks noGrp="1"/>
+          </p:cNvSpPr>
+          <p:nvPr>
+            <p:ph type="body" sz="quarter" idx="16"/>
+          </p:nvPr>
         </p:nvSpPr>
         <p:spPr>
           <a:xfrm>
-            <a:off x="595927" y="1302462"/>
-            <a:ext cx="7952145" cy="2554545"/>
+            <a:off x="627880" y="3978807"/>
+            <a:ext cx="6488113" cy="300082"/>
           </a:xfrm>
-          <a:prstGeom prst="rect">
-            <a:avLst/>
-          </a:prstGeom>
-          <a:noFill/>
         </p:spPr>
         <p:txBody>
-          <a:bodyPr wrap="square" rtlCol="0" anchor="ctr">
-            <a:spAutoFit/>
+          <a:bodyPr/>
+          <a:lstStyle/>
+          <a:p>
+            <a:r>
+              <a:rPr lang="en-US" dirty="0" smtClean="0"/>
+              <a:t>EPAM Big Data CC </a:t>
+            </a:r>
+            <a:endParaRPr lang="en-US" dirty="0"/>
+          </a:p>
+        </p:txBody>
+      </p:sp>
+      <p:sp>
+        <p:nvSpPr>
+          <p:cNvPr id="4" name="Text Placeholder 3"/>
+          <p:cNvSpPr>
+            <a:spLocks noGrp="1"/>
+          </p:cNvSpPr>
+          <p:nvPr>
+            <p:ph type="body" sz="quarter" idx="17"/>
+          </p:nvPr>
+        </p:nvSpPr>
+        <p:spPr>
+          <a:xfrm>
+            <a:off x="627880" y="4339260"/>
+            <a:ext cx="3649662" cy="279797"/>
+          </a:xfrm>
+        </p:spPr>
+        <p:txBody>
+          <a:bodyPr>
+            <a:normAutofit lnSpcReduction="10000"/>
           </a:bodyPr>
           <a:lstStyle/>
           <a:p>
-            <a:pPr algn="ctr"/>
-            <a:endParaRPr lang="en-US" sz="2400" b="1" dirty="0" smtClean="0"/>
-          </a:p>
-          <a:p>
-            <a:pPr algn="ctr"/>
-            <a:r>
-              <a:rPr lang="en-US" sz="2800" b="1" dirty="0" smtClean="0"/>
-              <a:t>Data Lab</a:t>
-            </a:r>
-          </a:p>
-          <a:p>
-            <a:pPr algn="ctr"/>
-            <a:endParaRPr lang="en-US" sz="2400" b="1" dirty="0"/>
-          </a:p>
-          <a:p>
-            <a:pPr algn="ctr"/>
-            <a:r>
-              <a:rPr lang="en-US" sz="2000" dirty="0" smtClean="0"/>
-              <a:t>Self-service, Fail-safe Exploratory Environment </a:t>
-            </a:r>
-          </a:p>
-          <a:p>
-            <a:pPr algn="ctr"/>
-            <a:r>
-              <a:rPr lang="en-US" sz="2000" dirty="0" smtClean="0"/>
-              <a:t>for </a:t>
-            </a:r>
-          </a:p>
-          <a:p>
-            <a:pPr algn="ctr"/>
-            <a:r>
-              <a:rPr lang="en-US" sz="2000" dirty="0" smtClean="0"/>
-              <a:t>Collaborative Data Science Workflow </a:t>
-            </a:r>
-          </a:p>
-          <a:p>
-            <a:pPr marL="285750" indent="-285750">
-              <a:buFont typeface="Arial" charset="0"/>
-              <a:buChar char="•"/>
-            </a:pPr>
-            <a:endParaRPr lang="en-US" sz="2400" dirty="0" smtClean="0"/>
+            <a:r>
+              <a:rPr lang="en-US" dirty="0" smtClean="0"/>
+              <a:t>June 6, 2016</a:t>
+            </a:r>
+            <a:endParaRPr lang="en-US" dirty="0"/>
           </a:p>
         </p:txBody>
       </p:sp>
+      <p:pic>
+        <p:nvPicPr>
+          <p:cNvPr id="8" name="Picture Placeholder 7" descr="logo_cover_5.png"/>
+          <p:cNvPicPr>
+            <a:picLocks noGrp="1" noChangeAspect="1"/>
+          </p:cNvPicPr>
+          <p:nvPr>
+            <p:ph type="pic" sz="quarter" idx="18"/>
+          </p:nvPr>
+        </p:nvPicPr>
+        <p:blipFill>
+          <a:blip r:embed="rId3">
+            <a:extLst>
+              <a:ext uri="{28A0092B-C50C-407E-A947-70E740481C1C}">
+                <a14:useLocalDpi xmlns:a14="http://schemas.microsoft.com/office/drawing/2010/main" val="0"/>
+              </a:ext>
+            </a:extLst>
+          </a:blip>
+          <a:srcRect t="3538" b="3538"/>
+          <a:stretch>
+            <a:fillRect/>
+          </a:stretch>
+        </p:blipFill>
+        <p:spPr/>
+      </p:pic>
     </p:spTree>
     <p:extLst>
       <p:ext uri="{BB962C8B-B14F-4D97-AF65-F5344CB8AC3E}">
-        <p14:creationId xmlns:p14="http://schemas.microsoft.com/office/powerpoint/2010/main" val="940289053"/>
+        <p14:creationId xmlns:p14="http://schemas.microsoft.com/office/powerpoint/2010/main" val="3511774988"/>
       </p:ext>
     </p:extLst>
   </p:cSld>
@@ -20489,15 +21042,7 @@
                   <a:srgbClr val="2FC2D9"/>
                 </a:solidFill>
               </a:rPr>
-              <a:t> </a:t>
-            </a:r>
-            <a:r>
-              <a:rPr lang="en-US" u="sng" dirty="0" smtClean="0">
-                <a:solidFill>
-                  <a:srgbClr val="2FC2D9"/>
-                </a:solidFill>
-              </a:rPr>
-              <a:t>lib box</a:t>
+              <a:t> lib box</a:t>
             </a:r>
           </a:p>
           <a:p>
@@ -20689,23 +21234,7 @@
                   <a:schemeClr val="tx1"/>
                 </a:solidFill>
               </a:rPr>
-              <a:t>Both </a:t>
-            </a:r>
-            <a:r>
-              <a:rPr lang="en-US" dirty="0" smtClean="0">
-                <a:solidFill>
-                  <a:schemeClr val="tx1"/>
-                </a:solidFill>
-              </a:rPr>
-              <a:t>actions (stop/terminate) </a:t>
-            </a:r>
-            <a:r>
-              <a:rPr lang="en-US" dirty="0" smtClean="0">
-                <a:solidFill>
-                  <a:schemeClr val="tx1"/>
-                </a:solidFill>
-              </a:rPr>
-              <a:t>must ask for confirmation</a:t>
+              <a:t>Both actions (stop/terminate) must ask for confirmation</a:t>
             </a:r>
             <a:endParaRPr lang="en-US" dirty="0">
               <a:solidFill>
@@ -21429,11 +21958,7 @@
             </a:r>
             <a:r>
               <a:rPr lang="en-US" dirty="0" smtClean="0"/>
-              <a:t> instance</a:t>
-            </a:r>
-            <a:r>
-              <a:rPr lang="en-US" dirty="0" smtClean="0"/>
-              <a:t>) – potentially pop up</a:t>
+              <a:t> instance) – potentially pop up</a:t>
             </a:r>
             <a:endParaRPr lang="en-US" dirty="0"/>
           </a:p>
@@ -30005,6 +30530,15 @@
 </file>
 
 <file path=customXml/item1.xml><?xml version="1.0" encoding="utf-8"?>
+<?mso-contentType ?>
+<FormTemplates xmlns="http://schemas.microsoft.com/sharepoint/v3/contenttype/forms">
+  <Display>DocumentLibraryForm</Display>
+  <Edit>DocumentLibraryForm</Edit>
+  <New>DocumentLibraryForm</New>
+</FormTemplates>
+</file>
+
+<file path=customXml/item2.xml><?xml version="1.0" encoding="utf-8"?>
 <ct:contentTypeSchema xmlns:ct="http://schemas.microsoft.com/office/2006/metadata/contentType" xmlns:ma="http://schemas.microsoft.com/office/2006/metadata/properties/metaAttributes" ct:_="" ma:_="" ma:contentTypeName="Document" ma:contentTypeID="0x010100B0E9A4A7D20EA84CAA39F80EA2A19865" ma:contentTypeVersion="1" ma:contentTypeDescription="Create a new document." ma:contentTypeScope="" ma:versionID="4ed0c655cf5595f31b06ef1418ca28bf">
   <xsd:schema xmlns:xsd="http://www.w3.org/2001/XMLSchema" xmlns:xs="http://www.w3.org/2001/XMLSchema" xmlns:p="http://schemas.microsoft.com/office/2006/metadata/properties" xmlns:ns1="http://schemas.microsoft.com/sharepoint/v3" targetNamespace="http://schemas.microsoft.com/office/2006/metadata/properties" ma:root="true" ma:fieldsID="4dcce58c87e9fcebab8021569449a8d0" ns1:_="">
     <xsd:import namespace="http://schemas.microsoft.com/sharepoint/v3"/>
@@ -30136,15 +30670,6 @@
 </ct:contentTypeSchema>
 </file>
 
-<file path=customXml/item2.xml><?xml version="1.0" encoding="utf-8"?>
-<?mso-contentType ?>
-<FormTemplates xmlns="http://schemas.microsoft.com/sharepoint/v3/contenttype/forms">
-  <Display>DocumentLibraryForm</Display>
-  <Edit>DocumentLibraryForm</Edit>
-  <New>DocumentLibraryForm</New>
-</FormTemplates>
-</file>
-
 <file path=customXml/item3.xml><?xml version="1.0" encoding="utf-8"?>
 <p:properties xmlns:p="http://schemas.microsoft.com/office/2006/metadata/properties" xmlns:xsi="http://www.w3.org/2001/XMLSchema-instance" xmlns:pc="http://schemas.microsoft.com/office/infopath/2007/PartnerControls">
   <documentManagement>
@@ -30155,6 +30680,14 @@
 </file>
 
 <file path=customXml/itemProps1.xml><?xml version="1.0" encoding="utf-8"?>
+<ds:datastoreItem xmlns:ds="http://schemas.openxmlformats.org/officeDocument/2006/customXml" ds:itemID="{14883F0F-DE57-4ECA-B9BB-F22E8C5B5D82}">
+  <ds:schemaRefs>
+    <ds:schemaRef ds:uri="http://schemas.microsoft.com/sharepoint/v3/contenttype/forms"/>
+  </ds:schemaRefs>
+</ds:datastoreItem>
+</file>
+
+<file path=customXml/itemProps2.xml><?xml version="1.0" encoding="utf-8"?>
 <ds:datastoreItem xmlns:ds="http://schemas.openxmlformats.org/officeDocument/2006/customXml" ds:itemID="{C3A1A37E-F8E3-427A-BCE9-B1DDB8B96CDF}">
   <ds:schemaRefs>
     <ds:schemaRef ds:uri="http://schemas.microsoft.com/office/2006/metadata/contentType"/>
@@ -30168,14 +30701,6 @@
     <ds:schemaRef ds:uri="http://purl.org/dc/elements/1.1/"/>
     <ds:schemaRef ds:uri="http://purl.org/dc/terms/"/>
     <ds:schemaRef ds:uri="http://schemas.microsoft.com/internal/obd"/>
-  </ds:schemaRefs>
-</ds:datastoreItem>
-</file>
-
-<file path=customXml/itemProps2.xml><?xml version="1.0" encoding="utf-8"?>
-<ds:datastoreItem xmlns:ds="http://schemas.openxmlformats.org/officeDocument/2006/customXml" ds:itemID="{14883F0F-DE57-4ECA-B9BB-F22E8C5B5D82}">
-  <ds:schemaRefs>
-    <ds:schemaRef ds:uri="http://schemas.microsoft.com/sharepoint/v3/contenttype/forms"/>
   </ds:schemaRefs>
 </ds:datastoreItem>
 </file>

</xml_diff>